<commit_message>
Done some Changes to Design Document
</commit_message>
<xml_diff>
--- a/ProjectDescription.pptx
+++ b/ProjectDescription.pptx
@@ -1118,7 +1118,7 @@
         </p:nvSpPr>
         <p:spPr>
           <a:xfrm>
-            <a:off x="381300" y="685800"/>
+            <a:off x="381000" y="685800"/>
             <a:ext cx="6096000" cy="3429000"/>
           </a:xfrm>
           <a:custGeom>
@@ -1219,7 +1219,7 @@
         </p:nvSpPr>
         <p:spPr>
           <a:xfrm>
-            <a:off x="381300" y="685800"/>
+            <a:off x="381000" y="685800"/>
             <a:ext cx="6096000" cy="3429000"/>
           </a:xfrm>
           <a:custGeom>
@@ -1320,7 +1320,7 @@
         </p:nvSpPr>
         <p:spPr>
           <a:xfrm>
-            <a:off x="381300" y="685800"/>
+            <a:off x="381000" y="685800"/>
             <a:ext cx="6096000" cy="3429000"/>
           </a:xfrm>
           <a:custGeom>
@@ -5755,7 +5755,7 @@
               <a:buNone/>
             </a:pPr>
             <a:r>
-              <a:rPr lang="en"/>
+              <a:rPr lang="en" dirty="0"/>
               <a:t>Now we have cab data and also user data. Now we need to provide a better Cab for the User. This process can be, when a user requests a Cab, From his current Location we can provide a Cab to him in two ways,</a:t>
             </a:r>
           </a:p>
@@ -5767,33 +5767,10 @@
               <a:buAutoNum type="arabicPeriod"/>
             </a:pPr>
             <a:r>
-              <a:rPr lang="en"/>
-              <a:t>We can give user a option to show the available cabs(or) book immediate.</a:t>
-            </a:r>
-          </a:p>
-          <a:p>
-            <a:pPr marL="1371600" lvl="1" indent="-228600" rtl="0">
-              <a:spcBef>
-                <a:spcPts val="0"/>
-              </a:spcBef>
-              <a:buAutoNum type="alphaLcPeriod"/>
-            </a:pPr>
-            <a:r>
-              <a:rPr lang="en" b="1"/>
-              <a:t>let me see available cabs</a:t>
-            </a:r>
-          </a:p>
-          <a:p>
-            <a:pPr marL="1371600" lvl="1" indent="-228600" rtl="0">
-              <a:spcBef>
-                <a:spcPts val="0"/>
-              </a:spcBef>
-              <a:buAutoNum type="alphaLcPeriod"/>
-            </a:pPr>
-            <a:r>
-              <a:rPr lang="en" b="1"/>
-              <a:t>Book Immediate</a:t>
-            </a:r>
+              <a:rPr lang="en" dirty="0" smtClean="0"/>
+              <a:t>When user wanted to book a cab, we can display all availabilities, path of the cab ETA of the Cab, by using below process </a:t>
+            </a:r>
+            <a:endParaRPr lang="en" b="1" dirty="0"/>
           </a:p>
           <a:p>
             <a:pPr marL="457200" lvl="0" indent="-228600" rtl="0">
@@ -5803,15 +5780,15 @@
               <a:buAutoNum type="arabicPeriod"/>
             </a:pPr>
             <a:r>
-              <a:rPr lang="en"/>
+              <a:rPr lang="en" dirty="0"/>
               <a:t>By using </a:t>
             </a:r>
             <a:r>
-              <a:rPr lang="en" b="1"/>
+              <a:rPr lang="en" b="1" dirty="0"/>
               <a:t>previous data</a:t>
             </a:r>
             <a:r>
-              <a:rPr lang="en"/>
+              <a:rPr lang="en" dirty="0"/>
               <a:t> for that location, Time and Cab type.</a:t>
             </a:r>
           </a:p>
@@ -5823,11 +5800,11 @@
               <a:buAutoNum type="arabicPeriod"/>
             </a:pPr>
             <a:r>
-              <a:rPr lang="en" b="1"/>
+              <a:rPr lang="en" b="1" dirty="0"/>
               <a:t>Dynamically calculating</a:t>
             </a:r>
             <a:r>
-              <a:rPr lang="en"/>
+              <a:rPr lang="en" dirty="0"/>
               <a:t> data for requested time, his location and Cab type.</a:t>
             </a:r>
           </a:p>
@@ -5839,7 +5816,7 @@
               <a:buAutoNum type="arabicPeriod"/>
             </a:pPr>
             <a:r>
-              <a:rPr lang="en"/>
+              <a:rPr lang="en" dirty="0"/>
               <a:t>By applying both 1 &amp; 2 techniques.</a:t>
             </a:r>
           </a:p>
@@ -5940,15 +5917,15 @@
               <a:buAutoNum type="arabicPeriod"/>
             </a:pPr>
             <a:r>
-              <a:rPr lang="en"/>
+              <a:rPr lang="en" dirty="0"/>
               <a:t>In this process, we should implement </a:t>
             </a:r>
             <a:r>
-              <a:rPr lang="en" b="1"/>
+              <a:rPr lang="en" b="1" dirty="0"/>
               <a:t>machine learning </a:t>
             </a:r>
             <a:r>
-              <a:rPr lang="en"/>
+              <a:rPr lang="en" dirty="0"/>
               <a:t>concepts. It can be done by AWS, we just need to provide previous data and user requirements. AWS will give us results.</a:t>
             </a:r>
           </a:p>
@@ -5960,51 +5937,59 @@
               <a:buAutoNum type="arabicPeriod"/>
             </a:pPr>
             <a:r>
-              <a:rPr lang="en"/>
+              <a:rPr lang="en" dirty="0"/>
               <a:t>After getting results we need to validate those results, the validations can be </a:t>
             </a:r>
           </a:p>
           <a:p>
-            <a:pPr marL="914400" lvl="1" indent="-228600" rtl="0">
-              <a:spcBef>
-                <a:spcPts val="0"/>
-              </a:spcBef>
+            <a:pPr marL="914400" lvl="1" indent="-228600">
+              <a:lnSpc>
+                <a:spcPct val="100000"/>
+              </a:lnSpc>
               <a:buAutoNum type="alphaLcPeriod"/>
             </a:pPr>
             <a:r>
-              <a:rPr lang="en"/>
-              <a:t>Need to find current location of result</a:t>
-            </a:r>
-          </a:p>
-          <a:p>
-            <a:pPr marL="914400" lvl="1" indent="-228600" rtl="0">
-              <a:spcBef>
-                <a:spcPts val="0"/>
-              </a:spcBef>
+              <a:rPr lang="en" dirty="0" smtClean="0"/>
+              <a:t>Need to filter Cabs which are</a:t>
+            </a:r>
+            <a:r>
+              <a:rPr lang="en" dirty="0" smtClean="0"/>
+              <a:t> </a:t>
+            </a:r>
+            <a:r>
+              <a:rPr lang="en" dirty="0"/>
+              <a:t>near to User </a:t>
+            </a:r>
+            <a:r>
+              <a:rPr lang="en" dirty="0" smtClean="0"/>
+              <a:t>location</a:t>
+            </a:r>
+            <a:r>
+              <a:rPr lang="en" dirty="0" smtClean="0"/>
+              <a:t>.</a:t>
+            </a:r>
+          </a:p>
+          <a:p>
+            <a:pPr marL="914400" lvl="1" indent="-228600">
+              <a:lnSpc>
+                <a:spcPct val="100000"/>
+              </a:lnSpc>
               <a:buAutoNum type="alphaLcPeriod"/>
             </a:pPr>
             <a:r>
-              <a:rPr lang="en"/>
-              <a:t>If current location is near to User location, need to filter out them</a:t>
-            </a:r>
-          </a:p>
-          <a:p>
-            <a:pPr marL="914400" lvl="1" indent="-228600" rtl="0">
-              <a:spcBef>
-                <a:spcPts val="0"/>
-              </a:spcBef>
-              <a:buAutoNum type="alphaLcPeriod"/>
-            </a:pPr>
-            <a:r>
-              <a:rPr lang="en"/>
-              <a:t>From here common steps for both </a:t>
-            </a:r>
-            <a:r>
-              <a:rPr lang="en" b="1"/>
+              <a:rPr lang="en" dirty="0" smtClean="0"/>
+              <a:t>From </a:t>
+            </a:r>
+            <a:r>
+              <a:rPr lang="en" dirty="0"/>
+              <a:t>here common steps for both </a:t>
+            </a:r>
+            <a:r>
+              <a:rPr lang="en" b="1" dirty="0"/>
               <a:t>Using</a:t>
             </a:r>
             <a:r>
-              <a:rPr lang="en" sz="2800" b="1">
+              <a:rPr lang="en" sz="2800" b="1" dirty="0">
                 <a:solidFill>
                   <a:schemeClr val="dk1"/>
                 </a:solidFill>
@@ -6012,7 +5997,7 @@
               <a:t> </a:t>
             </a:r>
             <a:r>
-              <a:rPr lang="en" b="1"/>
+              <a:rPr lang="en" b="1" dirty="0"/>
               <a:t>Dynamic data of Cab and Past Data.</a:t>
             </a:r>
           </a:p>
@@ -6055,8 +6040,8 @@
         </p:nvSpPr>
         <p:spPr>
           <a:xfrm>
-            <a:off x="311700" y="445025"/>
-            <a:ext cx="8520600" cy="572700"/>
+            <a:off x="304800" y="-19050"/>
+            <a:ext cx="8520600" cy="304800"/>
           </a:xfrm>
           <a:prstGeom prst="rect">
             <a:avLst/>
@@ -6075,7 +6060,7 @@
               <a:buNone/>
             </a:pPr>
             <a:r>
-              <a:rPr lang="en"/>
+              <a:rPr lang="en" dirty="0"/>
               <a:t>2. Using Dynamic data of Cab</a:t>
             </a:r>
           </a:p>
@@ -6093,8 +6078,8 @@
         </p:nvSpPr>
         <p:spPr>
           <a:xfrm>
-            <a:off x="311700" y="1152475"/>
-            <a:ext cx="8520600" cy="3416400"/>
+            <a:off x="311700" y="514350"/>
+            <a:ext cx="8520600" cy="3597325"/>
           </a:xfrm>
           <a:prstGeom prst="rect">
             <a:avLst/>
@@ -6107,160 +6092,209 @@
           <a:lstStyle/>
           <a:p>
             <a:pPr marL="457200" lvl="0" indent="-228600" rtl="0">
+              <a:lnSpc>
+                <a:spcPct val="100000"/>
+              </a:lnSpc>
               <a:spcBef>
                 <a:spcPts val="0"/>
               </a:spcBef>
               <a:buAutoNum type="arabicPeriod"/>
             </a:pPr>
             <a:r>
-              <a:rPr lang="en"/>
+              <a:rPr lang="en" sz="1000" dirty="0"/>
               <a:t>In this process, we should get data of Cabs according to the User requests.</a:t>
             </a:r>
           </a:p>
           <a:p>
             <a:pPr marL="457200" lvl="0" indent="-228600" rtl="0">
+              <a:lnSpc>
+                <a:spcPct val="100000"/>
+              </a:lnSpc>
               <a:spcBef>
                 <a:spcPts val="0"/>
               </a:spcBef>
               <a:buAutoNum type="arabicPeriod"/>
             </a:pPr>
             <a:r>
-              <a:rPr lang="en"/>
+              <a:rPr lang="en" sz="1000" dirty="0"/>
               <a:t>Steps involved in this procedure are</a:t>
             </a:r>
           </a:p>
           <a:p>
             <a:pPr marL="914400" lvl="1" indent="-228600" rtl="0">
+              <a:lnSpc>
+                <a:spcPct val="100000"/>
+              </a:lnSpc>
               <a:spcBef>
                 <a:spcPts val="0"/>
               </a:spcBef>
               <a:buAutoNum type="alphaLcPeriod"/>
             </a:pPr>
             <a:r>
-              <a:rPr lang="en"/>
-              <a:t>Need to find cabs according the current location of user and Cab type requested.</a:t>
-            </a:r>
+              <a:rPr lang="en" sz="1000" dirty="0"/>
+              <a:t>Need to find cabs according the current location of </a:t>
+            </a:r>
+            <a:r>
+              <a:rPr lang="en" sz="1000" dirty="0" smtClean="0"/>
+              <a:t>user and Cab type if requested.</a:t>
+            </a:r>
+            <a:endParaRPr lang="en" sz="1000" dirty="0"/>
           </a:p>
           <a:p>
             <a:pPr marL="914400" lvl="1" indent="-228600" rtl="0">
+              <a:lnSpc>
+                <a:spcPct val="100000"/>
+              </a:lnSpc>
               <a:spcBef>
                 <a:spcPts val="0"/>
               </a:spcBef>
               <a:buAutoNum type="alphaLcPeriod"/>
             </a:pPr>
             <a:r>
-              <a:rPr lang="en"/>
+              <a:rPr lang="en" sz="1000" dirty="0"/>
               <a:t>Get cabs which are near to the user Location with following conditions</a:t>
             </a:r>
           </a:p>
           <a:p>
             <a:pPr marL="1371600" lvl="2" indent="-228600" rtl="0">
+              <a:lnSpc>
+                <a:spcPct val="100000"/>
+              </a:lnSpc>
               <a:spcBef>
                 <a:spcPts val="0"/>
               </a:spcBef>
               <a:buAutoNum type="romanLcPeriod"/>
             </a:pPr>
             <a:r>
-              <a:rPr lang="en"/>
+              <a:rPr lang="en" sz="1000" dirty="0"/>
               <a:t>Cabs which are ready for a ride and </a:t>
             </a:r>
           </a:p>
           <a:p>
             <a:pPr marL="1371600" lvl="2" indent="-228600" rtl="0">
+              <a:lnSpc>
+                <a:spcPct val="100000"/>
+              </a:lnSpc>
               <a:spcBef>
                 <a:spcPts val="0"/>
               </a:spcBef>
               <a:buAutoNum type="romanLcPeriod"/>
             </a:pPr>
             <a:r>
-              <a:rPr lang="en"/>
+              <a:rPr lang="en" sz="1000" dirty="0"/>
               <a:t>Which are traveling towards user location, if no Cab’s available, get  with shortest path.</a:t>
             </a:r>
           </a:p>
           <a:p>
             <a:pPr marL="1371600" lvl="2" indent="-228600" rtl="0">
+              <a:lnSpc>
+                <a:spcPct val="100000"/>
+              </a:lnSpc>
               <a:spcBef>
                 <a:spcPts val="0"/>
               </a:spcBef>
               <a:buAutoNum type="romanLcPeriod"/>
             </a:pPr>
             <a:r>
-              <a:rPr lang="en"/>
+              <a:rPr lang="en" sz="1000" dirty="0"/>
               <a:t>If many cabs are matching with same distance, take which have good speed and Less </a:t>
             </a:r>
             <a:r>
-              <a:rPr lang="en" b="1"/>
+              <a:rPr lang="en" sz="1000" b="1" dirty="0"/>
               <a:t>traffic </a:t>
             </a:r>
             <a:r>
-              <a:rPr lang="en"/>
+              <a:rPr lang="en" sz="1000" dirty="0"/>
               <a:t>in their path using Google Api.</a:t>
             </a:r>
           </a:p>
           <a:p>
             <a:pPr marL="914400" lvl="1" indent="-228600" rtl="0">
+              <a:lnSpc>
+                <a:spcPct val="100000"/>
+              </a:lnSpc>
               <a:spcBef>
                 <a:spcPts val="0"/>
               </a:spcBef>
               <a:buAutoNum type="alphaLcPeriod"/>
             </a:pPr>
             <a:r>
-              <a:rPr lang="en"/>
-              <a:t>Get the List of cab’s with their estimated time of arrival Sorted with Time and Distance</a:t>
-            </a:r>
-          </a:p>
-          <a:p>
-            <a:pPr marL="1371600" lvl="2" indent="-228600" rtl="0">
-              <a:spcBef>
-                <a:spcPts val="0"/>
-              </a:spcBef>
-              <a:buAutoNum type="romanLcPeriod"/>
-            </a:pPr>
-            <a:r>
-              <a:rPr lang="en"/>
-              <a:t> if he selects immediate at the time of booking just send request to cab which are near, in a Sequence if not accepted</a:t>
-            </a:r>
-          </a:p>
-          <a:p>
-            <a:pPr marL="1371600" lvl="2" indent="-228600" rtl="0">
-              <a:spcBef>
-                <a:spcPts val="0"/>
-              </a:spcBef>
-              <a:buAutoNum type="romanLcPeriod"/>
-            </a:pPr>
-            <a:r>
-              <a:rPr lang="en"/>
-              <a:t>If selects </a:t>
-            </a:r>
-            <a:r>
-              <a:rPr lang="en" b="1"/>
-              <a:t>let me see options, </a:t>
-            </a:r>
-            <a:r>
-              <a:rPr lang="en"/>
-              <a:t>List all the options to the user and let him select.</a:t>
+              <a:rPr lang="en" sz="1000" dirty="0"/>
+              <a:t>Get the List of cab’s with their estimated time of arrival Sorted with Time and </a:t>
+            </a:r>
+            <a:r>
+              <a:rPr lang="en" sz="1000" dirty="0" smtClean="0"/>
+              <a:t>Distance and Show to the User with details like path and ETA of the Cab(All types if he not selcted at first).</a:t>
             </a:r>
           </a:p>
           <a:p>
             <a:pPr marL="914400" lvl="1" indent="-228600" rtl="0">
+              <a:lnSpc>
+                <a:spcPct val="100000"/>
+              </a:lnSpc>
               <a:spcBef>
                 <a:spcPts val="0"/>
               </a:spcBef>
               <a:buAutoNum type="alphaLcPeriod"/>
             </a:pPr>
             <a:r>
-              <a:rPr lang="en"/>
-              <a:t>Start the ride.</a:t>
+              <a:rPr lang="en-US" sz="1000" dirty="0" smtClean="0"/>
+              <a:t>A</a:t>
+            </a:r>
+            <a:r>
+              <a:rPr lang="en" sz="1000" dirty="0" smtClean="0"/>
+              <a:t>sk User to select type of Cab required, and display accordingly.</a:t>
+            </a:r>
+          </a:p>
+          <a:p>
+            <a:pPr marL="914400" lvl="1" indent="-228600" rtl="0">
+              <a:lnSpc>
+                <a:spcPct val="100000"/>
+              </a:lnSpc>
+              <a:spcBef>
+                <a:spcPts val="0"/>
+              </a:spcBef>
+              <a:buAutoNum type="alphaLcPeriod"/>
+            </a:pPr>
+            <a:r>
+              <a:rPr lang="en" sz="1000" dirty="0" smtClean="0"/>
+              <a:t>If User Selected to start a ride, Send requests to Cab’s in the same sequence and return cab which acceted th ride.</a:t>
+            </a:r>
+            <a:r>
+              <a:rPr lang="en" sz="1000" dirty="0" smtClean="0"/>
+              <a:t> </a:t>
+            </a:r>
+          </a:p>
+          <a:p>
+            <a:pPr marL="914400" lvl="1" indent="-228600" rtl="0">
+              <a:lnSpc>
+                <a:spcPct val="100000"/>
+              </a:lnSpc>
+              <a:spcBef>
+                <a:spcPts val="0"/>
+              </a:spcBef>
+              <a:buAutoNum type="alphaLcPeriod"/>
+            </a:pPr>
+            <a:r>
+              <a:rPr lang="en" sz="1000" dirty="0" smtClean="0"/>
+              <a:t>Start </a:t>
+            </a:r>
+            <a:r>
+              <a:rPr lang="en" sz="1000" dirty="0"/>
+              <a:t>the ride.</a:t>
             </a:r>
           </a:p>
           <a:p>
             <a:pPr lvl="0">
-              <a:spcBef>
-                <a:spcPts val="0"/>
-              </a:spcBef>
-              <a:buNone/>
-            </a:pPr>
-            <a:endParaRPr/>
+              <a:lnSpc>
+                <a:spcPct val="100000"/>
+              </a:lnSpc>
+              <a:spcBef>
+                <a:spcPts val="0"/>
+              </a:spcBef>
+              <a:buNone/>
+            </a:pPr>
+            <a:endParaRPr sz="1000" dirty="0"/>
           </a:p>
         </p:txBody>
       </p:sp>

</xml_diff>